<commit_message>
Update Int Num / Lab 2 OpenCV
</commit_message>
<xml_diff>
--- a/InterfacageNumerique/TP/bloc_VI_2026/autres/Mire_Foucault.pptx
+++ b/InterfacageNumerique/TP/bloc_VI_2026/autres/Mire_Foucault.pptx
@@ -243,7 +243,7 @@
           <a:p>
             <a:fld id="{4FE3012F-2CE9-4275-BACF-0022BCCFD0F9}" type="datetimeFigureOut">
               <a:rPr lang="fr-FR" smtClean="0"/>
-              <a:t>20/11/2025</a:t>
+              <a:t>25/11/2025</a:t>
             </a:fld>
             <a:endParaRPr lang="fr-FR"/>
           </a:p>
@@ -413,7 +413,7 @@
           <a:p>
             <a:fld id="{4FE3012F-2CE9-4275-BACF-0022BCCFD0F9}" type="datetimeFigureOut">
               <a:rPr lang="fr-FR" smtClean="0"/>
-              <a:t>20/11/2025</a:t>
+              <a:t>25/11/2025</a:t>
             </a:fld>
             <a:endParaRPr lang="fr-FR"/>
           </a:p>
@@ -593,7 +593,7 @@
           <a:p>
             <a:fld id="{4FE3012F-2CE9-4275-BACF-0022BCCFD0F9}" type="datetimeFigureOut">
               <a:rPr lang="fr-FR" smtClean="0"/>
-              <a:t>20/11/2025</a:t>
+              <a:t>25/11/2025</a:t>
             </a:fld>
             <a:endParaRPr lang="fr-FR"/>
           </a:p>
@@ -763,7 +763,7 @@
           <a:p>
             <a:fld id="{4FE3012F-2CE9-4275-BACF-0022BCCFD0F9}" type="datetimeFigureOut">
               <a:rPr lang="fr-FR" smtClean="0"/>
-              <a:t>20/11/2025</a:t>
+              <a:t>25/11/2025</a:t>
             </a:fld>
             <a:endParaRPr lang="fr-FR"/>
           </a:p>
@@ -1009,7 +1009,7 @@
           <a:p>
             <a:fld id="{4FE3012F-2CE9-4275-BACF-0022BCCFD0F9}" type="datetimeFigureOut">
               <a:rPr lang="fr-FR" smtClean="0"/>
-              <a:t>20/11/2025</a:t>
+              <a:t>25/11/2025</a:t>
             </a:fld>
             <a:endParaRPr lang="fr-FR"/>
           </a:p>
@@ -1241,7 +1241,7 @@
           <a:p>
             <a:fld id="{4FE3012F-2CE9-4275-BACF-0022BCCFD0F9}" type="datetimeFigureOut">
               <a:rPr lang="fr-FR" smtClean="0"/>
-              <a:t>20/11/2025</a:t>
+              <a:t>25/11/2025</a:t>
             </a:fld>
             <a:endParaRPr lang="fr-FR"/>
           </a:p>
@@ -1608,7 +1608,7 @@
           <a:p>
             <a:fld id="{4FE3012F-2CE9-4275-BACF-0022BCCFD0F9}" type="datetimeFigureOut">
               <a:rPr lang="fr-FR" smtClean="0"/>
-              <a:t>20/11/2025</a:t>
+              <a:t>25/11/2025</a:t>
             </a:fld>
             <a:endParaRPr lang="fr-FR"/>
           </a:p>
@@ -1726,7 +1726,7 @@
           <a:p>
             <a:fld id="{4FE3012F-2CE9-4275-BACF-0022BCCFD0F9}" type="datetimeFigureOut">
               <a:rPr lang="fr-FR" smtClean="0"/>
-              <a:t>20/11/2025</a:t>
+              <a:t>25/11/2025</a:t>
             </a:fld>
             <a:endParaRPr lang="fr-FR"/>
           </a:p>
@@ -1821,7 +1821,7 @@
           <a:p>
             <a:fld id="{4FE3012F-2CE9-4275-BACF-0022BCCFD0F9}" type="datetimeFigureOut">
               <a:rPr lang="fr-FR" smtClean="0"/>
-              <a:t>20/11/2025</a:t>
+              <a:t>25/11/2025</a:t>
             </a:fld>
             <a:endParaRPr lang="fr-FR"/>
           </a:p>
@@ -2098,7 +2098,7 @@
           <a:p>
             <a:fld id="{4FE3012F-2CE9-4275-BACF-0022BCCFD0F9}" type="datetimeFigureOut">
               <a:rPr lang="fr-FR" smtClean="0"/>
-              <a:t>20/11/2025</a:t>
+              <a:t>25/11/2025</a:t>
             </a:fld>
             <a:endParaRPr lang="fr-FR"/>
           </a:p>
@@ -2355,7 +2355,7 @@
           <a:p>
             <a:fld id="{4FE3012F-2CE9-4275-BACF-0022BCCFD0F9}" type="datetimeFigureOut">
               <a:rPr lang="fr-FR" smtClean="0"/>
-              <a:t>20/11/2025</a:t>
+              <a:t>25/11/2025</a:t>
             </a:fld>
             <a:endParaRPr lang="fr-FR"/>
           </a:p>
@@ -2568,7 +2568,7 @@
           <a:p>
             <a:fld id="{4FE3012F-2CE9-4275-BACF-0022BCCFD0F9}" type="datetimeFigureOut">
               <a:rPr lang="fr-FR" smtClean="0"/>
-              <a:t>20/11/2025</a:t>
+              <a:t>25/11/2025</a:t>
             </a:fld>
             <a:endParaRPr lang="fr-FR"/>
           </a:p>
@@ -2987,7 +2987,7 @@
         </p:nvSpPr>
         <p:spPr>
           <a:xfrm>
-            <a:off x="1606550" y="1244419"/>
+            <a:off x="1485900" y="1244419"/>
             <a:ext cx="36000" cy="360000"/>
           </a:xfrm>
           <a:prstGeom prst="rect">
@@ -3039,7 +3039,7 @@
         </p:nvSpPr>
         <p:spPr>
           <a:xfrm>
-            <a:off x="1678550" y="1244419"/>
+            <a:off x="1557900" y="1244419"/>
             <a:ext cx="36000" cy="360000"/>
           </a:xfrm>
           <a:prstGeom prst="rect">
@@ -3091,7 +3091,7 @@
         </p:nvSpPr>
         <p:spPr>
           <a:xfrm>
-            <a:off x="1750550" y="1244419"/>
+            <a:off x="1629900" y="1244419"/>
             <a:ext cx="36000" cy="360000"/>
           </a:xfrm>
           <a:prstGeom prst="rect">
@@ -3143,7 +3143,7 @@
         </p:nvSpPr>
         <p:spPr>
           <a:xfrm>
-            <a:off x="1822550" y="1244419"/>
+            <a:off x="1701900" y="1244419"/>
             <a:ext cx="36000" cy="360000"/>
           </a:xfrm>
           <a:prstGeom prst="rect">
@@ -3195,7 +3195,7 @@
         </p:nvSpPr>
         <p:spPr>
           <a:xfrm>
-            <a:off x="1894550" y="1244419"/>
+            <a:off x="1773900" y="1244419"/>
             <a:ext cx="36000" cy="360000"/>
           </a:xfrm>
           <a:prstGeom prst="rect">
@@ -3247,7 +3247,7 @@
         </p:nvSpPr>
         <p:spPr>
           <a:xfrm>
-            <a:off x="1966550" y="1244419"/>
+            <a:off x="1845900" y="1244419"/>
             <a:ext cx="36000" cy="360000"/>
           </a:xfrm>
           <a:prstGeom prst="rect">
@@ -3298,9 +3298,9 @@
           <p:nvPr/>
         </p:nvSpPr>
         <p:spPr>
-          <a:xfrm>
-            <a:off x="1435332" y="875087"/>
-            <a:ext cx="702436" cy="369332"/>
+          <a:xfrm rot="16200000">
+            <a:off x="1322698" y="729431"/>
+            <a:ext cx="686406" cy="276999"/>
           </a:xfrm>
           <a:prstGeom prst="rect">
             <a:avLst/>
@@ -3314,8 +3314,8 @@
           <a:lstStyle/>
           <a:p>
             <a:r>
-              <a:rPr lang="fr-FR" dirty="0"/>
-              <a:t>1mm</a:t>
+              <a:rPr lang="fr-FR" sz="1200" dirty="0"/>
+              <a:t>1.0 mm</a:t>
             </a:r>
           </a:p>
         </p:txBody>
@@ -3385,9 +3385,9 @@
           <p:nvPr/>
         </p:nvSpPr>
         <p:spPr>
-          <a:xfrm>
-            <a:off x="647287" y="882185"/>
-            <a:ext cx="702436" cy="369332"/>
+          <a:xfrm rot="16200000">
+            <a:off x="613803" y="729431"/>
+            <a:ext cx="686406" cy="276999"/>
           </a:xfrm>
           <a:prstGeom prst="rect">
             <a:avLst/>
@@ -3401,8 +3401,8 @@
           <a:lstStyle/>
           <a:p>
             <a:r>
-              <a:rPr lang="fr-FR" dirty="0"/>
-              <a:t>2mm</a:t>
+              <a:rPr lang="fr-FR" sz="1200" dirty="0"/>
+              <a:t>2.0 mm</a:t>
             </a:r>
           </a:p>
         </p:txBody>
@@ -3629,7 +3629,7 @@
         </p:nvSpPr>
         <p:spPr>
           <a:xfrm>
-            <a:off x="2344986" y="1238443"/>
+            <a:off x="2090986" y="1238443"/>
             <a:ext cx="18000" cy="360000"/>
           </a:xfrm>
           <a:prstGeom prst="rect">
@@ -3680,9 +3680,9 @@
           <p:nvPr/>
         </p:nvSpPr>
         <p:spPr>
-          <a:xfrm>
-            <a:off x="2173768" y="869111"/>
-            <a:ext cx="891591" cy="369332"/>
+          <a:xfrm rot="16200000">
+            <a:off x="1863961" y="708057"/>
+            <a:ext cx="686406" cy="276999"/>
           </a:xfrm>
           <a:prstGeom prst="rect">
             <a:avLst/>
@@ -3696,8 +3696,8 @@
           <a:lstStyle/>
           <a:p>
             <a:r>
-              <a:rPr lang="fr-FR" dirty="0"/>
-              <a:t>0.5mm</a:t>
+              <a:rPr lang="fr-FR" sz="1200" dirty="0"/>
+              <a:t>0.5 mm</a:t>
             </a:r>
           </a:p>
         </p:txBody>
@@ -3716,7 +3716,7 @@
         </p:nvSpPr>
         <p:spPr>
           <a:xfrm>
-            <a:off x="2381204" y="1238443"/>
+            <a:off x="2127204" y="1238443"/>
             <a:ext cx="18000" cy="360000"/>
           </a:xfrm>
           <a:prstGeom prst="rect">
@@ -3768,7 +3768,7 @@
         </p:nvSpPr>
         <p:spPr>
           <a:xfrm>
-            <a:off x="2416627" y="1238057"/>
+            <a:off x="2162627" y="1238057"/>
             <a:ext cx="18000" cy="360000"/>
           </a:xfrm>
           <a:prstGeom prst="rect">
@@ -3820,7 +3820,7 @@
         </p:nvSpPr>
         <p:spPr>
           <a:xfrm>
-            <a:off x="2452845" y="1238057"/>
+            <a:off x="2198845" y="1238057"/>
             <a:ext cx="18000" cy="360000"/>
           </a:xfrm>
           <a:prstGeom prst="rect">
@@ -3872,7 +3872,7 @@
         </p:nvSpPr>
         <p:spPr>
           <a:xfrm>
-            <a:off x="2488268" y="1238057"/>
+            <a:off x="2234268" y="1238057"/>
             <a:ext cx="18000" cy="360000"/>
           </a:xfrm>
           <a:prstGeom prst="rect">
@@ -3924,7 +3924,7 @@
         </p:nvSpPr>
         <p:spPr>
           <a:xfrm>
-            <a:off x="2524486" y="1238057"/>
+            <a:off x="2270486" y="1238057"/>
             <a:ext cx="18000" cy="360000"/>
           </a:xfrm>
           <a:prstGeom prst="rect">
@@ -3976,7 +3976,7 @@
         </p:nvSpPr>
         <p:spPr>
           <a:xfrm>
-            <a:off x="2559909" y="1238057"/>
+            <a:off x="2305909" y="1238057"/>
             <a:ext cx="18000" cy="360000"/>
           </a:xfrm>
           <a:prstGeom prst="rect">
@@ -4028,7 +4028,7 @@
         </p:nvSpPr>
         <p:spPr>
           <a:xfrm>
-            <a:off x="2596127" y="1238057"/>
+            <a:off x="2342127" y="1238057"/>
             <a:ext cx="18000" cy="360000"/>
           </a:xfrm>
           <a:prstGeom prst="rect">
@@ -4160,6 +4160,1081 @@
           </a:extLst>
         </p:spPr>
       </p:pic>
+      <p:sp>
+        <p:nvSpPr>
+          <p:cNvPr id="2" name="Rectangle 1">
+            <a:extLst>
+              <a:ext uri="{FF2B5EF4-FFF2-40B4-BE49-F238E27FC236}">
+                <a16:creationId xmlns:a16="http://schemas.microsoft.com/office/drawing/2014/main" id="{63C4CA4E-03B7-6EF4-1413-8628CDCDADF9}"/>
+              </a:ext>
+            </a:extLst>
+          </p:cNvPr>
+          <p:cNvSpPr/>
+          <p:nvPr/>
+        </p:nvSpPr>
+        <p:spPr>
+          <a:xfrm>
+            <a:off x="2551931" y="1238057"/>
+            <a:ext cx="7200" cy="360000"/>
+          </a:xfrm>
+          <a:prstGeom prst="rect">
+            <a:avLst/>
+          </a:prstGeom>
+          <a:solidFill>
+            <a:schemeClr val="tx1"/>
+          </a:solidFill>
+          <a:ln>
+            <a:noFill/>
+          </a:ln>
+        </p:spPr>
+        <p:style>
+          <a:lnRef idx="2">
+            <a:schemeClr val="accent1">
+              <a:shade val="15000"/>
+            </a:schemeClr>
+          </a:lnRef>
+          <a:fillRef idx="1">
+            <a:schemeClr val="accent1"/>
+          </a:fillRef>
+          <a:effectRef idx="0">
+            <a:schemeClr val="accent1"/>
+          </a:effectRef>
+          <a:fontRef idx="minor">
+            <a:schemeClr val="lt1"/>
+          </a:fontRef>
+        </p:style>
+        <p:txBody>
+          <a:bodyPr rtlCol="0" anchor="ctr"/>
+          <a:lstStyle/>
+          <a:p>
+            <a:pPr algn="ctr"/>
+            <a:endParaRPr lang="fr-FR" dirty="0"/>
+          </a:p>
+        </p:txBody>
+      </p:sp>
+      <p:sp>
+        <p:nvSpPr>
+          <p:cNvPr id="5" name="Rectangle 4">
+            <a:extLst>
+              <a:ext uri="{FF2B5EF4-FFF2-40B4-BE49-F238E27FC236}">
+                <a16:creationId xmlns:a16="http://schemas.microsoft.com/office/drawing/2014/main" id="{7E772D15-2B0F-C8B8-E8A2-815FAF084806}"/>
+              </a:ext>
+            </a:extLst>
+          </p:cNvPr>
+          <p:cNvSpPr/>
+          <p:nvPr/>
+        </p:nvSpPr>
+        <p:spPr>
+          <a:xfrm>
+            <a:off x="2566486" y="1238057"/>
+            <a:ext cx="7200" cy="360000"/>
+          </a:xfrm>
+          <a:prstGeom prst="rect">
+            <a:avLst/>
+          </a:prstGeom>
+          <a:solidFill>
+            <a:schemeClr val="tx1"/>
+          </a:solidFill>
+          <a:ln>
+            <a:noFill/>
+          </a:ln>
+        </p:spPr>
+        <p:style>
+          <a:lnRef idx="2">
+            <a:schemeClr val="accent1">
+              <a:shade val="15000"/>
+            </a:schemeClr>
+          </a:lnRef>
+          <a:fillRef idx="1">
+            <a:schemeClr val="accent1"/>
+          </a:fillRef>
+          <a:effectRef idx="0">
+            <a:schemeClr val="accent1"/>
+          </a:effectRef>
+          <a:fontRef idx="minor">
+            <a:schemeClr val="lt1"/>
+          </a:fontRef>
+        </p:style>
+        <p:txBody>
+          <a:bodyPr rtlCol="0" anchor="ctr"/>
+          <a:lstStyle/>
+          <a:p>
+            <a:pPr algn="ctr"/>
+            <a:endParaRPr lang="fr-FR" dirty="0"/>
+          </a:p>
+        </p:txBody>
+      </p:sp>
+      <p:sp>
+        <p:nvSpPr>
+          <p:cNvPr id="9" name="Rectangle 8">
+            <a:extLst>
+              <a:ext uri="{FF2B5EF4-FFF2-40B4-BE49-F238E27FC236}">
+                <a16:creationId xmlns:a16="http://schemas.microsoft.com/office/drawing/2014/main" id="{AD577D30-7A2A-CFCB-D530-C80C8C28500B}"/>
+              </a:ext>
+            </a:extLst>
+          </p:cNvPr>
+          <p:cNvSpPr/>
+          <p:nvPr/>
+        </p:nvSpPr>
+        <p:spPr>
+          <a:xfrm>
+            <a:off x="2580154" y="1238057"/>
+            <a:ext cx="7200" cy="360000"/>
+          </a:xfrm>
+          <a:prstGeom prst="rect">
+            <a:avLst/>
+          </a:prstGeom>
+          <a:solidFill>
+            <a:schemeClr val="tx1"/>
+          </a:solidFill>
+          <a:ln>
+            <a:noFill/>
+          </a:ln>
+        </p:spPr>
+        <p:style>
+          <a:lnRef idx="2">
+            <a:schemeClr val="accent1">
+              <a:shade val="15000"/>
+            </a:schemeClr>
+          </a:lnRef>
+          <a:fillRef idx="1">
+            <a:schemeClr val="accent1"/>
+          </a:fillRef>
+          <a:effectRef idx="0">
+            <a:schemeClr val="accent1"/>
+          </a:effectRef>
+          <a:fontRef idx="minor">
+            <a:schemeClr val="lt1"/>
+          </a:fontRef>
+        </p:style>
+        <p:txBody>
+          <a:bodyPr rtlCol="0" anchor="ctr"/>
+          <a:lstStyle/>
+          <a:p>
+            <a:pPr algn="ctr"/>
+            <a:endParaRPr lang="fr-FR" dirty="0"/>
+          </a:p>
+        </p:txBody>
+      </p:sp>
+      <p:sp>
+        <p:nvSpPr>
+          <p:cNvPr id="13" name="Rectangle 12">
+            <a:extLst>
+              <a:ext uri="{FF2B5EF4-FFF2-40B4-BE49-F238E27FC236}">
+                <a16:creationId xmlns:a16="http://schemas.microsoft.com/office/drawing/2014/main" id="{D005D0F9-7306-EF8F-9D6A-19CD31E86EC0}"/>
+              </a:ext>
+            </a:extLst>
+          </p:cNvPr>
+          <p:cNvSpPr/>
+          <p:nvPr/>
+        </p:nvSpPr>
+        <p:spPr>
+          <a:xfrm>
+            <a:off x="2594554" y="1238057"/>
+            <a:ext cx="7200" cy="360000"/>
+          </a:xfrm>
+          <a:prstGeom prst="rect">
+            <a:avLst/>
+          </a:prstGeom>
+          <a:solidFill>
+            <a:schemeClr val="tx1"/>
+          </a:solidFill>
+          <a:ln>
+            <a:noFill/>
+          </a:ln>
+        </p:spPr>
+        <p:style>
+          <a:lnRef idx="2">
+            <a:schemeClr val="accent1">
+              <a:shade val="15000"/>
+            </a:schemeClr>
+          </a:lnRef>
+          <a:fillRef idx="1">
+            <a:schemeClr val="accent1"/>
+          </a:fillRef>
+          <a:effectRef idx="0">
+            <a:schemeClr val="accent1"/>
+          </a:effectRef>
+          <a:fontRef idx="minor">
+            <a:schemeClr val="lt1"/>
+          </a:fontRef>
+        </p:style>
+        <p:txBody>
+          <a:bodyPr rtlCol="0" anchor="ctr"/>
+          <a:lstStyle/>
+          <a:p>
+            <a:pPr algn="ctr"/>
+            <a:endParaRPr lang="fr-FR" dirty="0"/>
+          </a:p>
+        </p:txBody>
+      </p:sp>
+      <p:sp>
+        <p:nvSpPr>
+          <p:cNvPr id="18" name="Rectangle 17">
+            <a:extLst>
+              <a:ext uri="{FF2B5EF4-FFF2-40B4-BE49-F238E27FC236}">
+                <a16:creationId xmlns:a16="http://schemas.microsoft.com/office/drawing/2014/main" id="{5469347E-6F89-B319-6FCC-1EE868904148}"/>
+              </a:ext>
+            </a:extLst>
+          </p:cNvPr>
+          <p:cNvSpPr/>
+          <p:nvPr/>
+        </p:nvSpPr>
+        <p:spPr>
+          <a:xfrm>
+            <a:off x="2609109" y="1238057"/>
+            <a:ext cx="7200" cy="360000"/>
+          </a:xfrm>
+          <a:prstGeom prst="rect">
+            <a:avLst/>
+          </a:prstGeom>
+          <a:solidFill>
+            <a:schemeClr val="tx1"/>
+          </a:solidFill>
+          <a:ln>
+            <a:noFill/>
+          </a:ln>
+        </p:spPr>
+        <p:style>
+          <a:lnRef idx="2">
+            <a:schemeClr val="accent1">
+              <a:shade val="15000"/>
+            </a:schemeClr>
+          </a:lnRef>
+          <a:fillRef idx="1">
+            <a:schemeClr val="accent1"/>
+          </a:fillRef>
+          <a:effectRef idx="0">
+            <a:schemeClr val="accent1"/>
+          </a:effectRef>
+          <a:fontRef idx="minor">
+            <a:schemeClr val="lt1"/>
+          </a:fontRef>
+        </p:style>
+        <p:txBody>
+          <a:bodyPr rtlCol="0" anchor="ctr"/>
+          <a:lstStyle/>
+          <a:p>
+            <a:pPr algn="ctr"/>
+            <a:endParaRPr lang="fr-FR" dirty="0"/>
+          </a:p>
+        </p:txBody>
+      </p:sp>
+      <p:sp>
+        <p:nvSpPr>
+          <p:cNvPr id="23" name="Rectangle 22">
+            <a:extLst>
+              <a:ext uri="{FF2B5EF4-FFF2-40B4-BE49-F238E27FC236}">
+                <a16:creationId xmlns:a16="http://schemas.microsoft.com/office/drawing/2014/main" id="{4575C9C1-CD37-2DA5-C1A1-BC926F9B5E9B}"/>
+              </a:ext>
+            </a:extLst>
+          </p:cNvPr>
+          <p:cNvSpPr/>
+          <p:nvPr/>
+        </p:nvSpPr>
+        <p:spPr>
+          <a:xfrm>
+            <a:off x="2623509" y="1238057"/>
+            <a:ext cx="7200" cy="360000"/>
+          </a:xfrm>
+          <a:prstGeom prst="rect">
+            <a:avLst/>
+          </a:prstGeom>
+          <a:solidFill>
+            <a:schemeClr val="tx1"/>
+          </a:solidFill>
+          <a:ln>
+            <a:noFill/>
+          </a:ln>
+        </p:spPr>
+        <p:style>
+          <a:lnRef idx="2">
+            <a:schemeClr val="accent1">
+              <a:shade val="15000"/>
+            </a:schemeClr>
+          </a:lnRef>
+          <a:fillRef idx="1">
+            <a:schemeClr val="accent1"/>
+          </a:fillRef>
+          <a:effectRef idx="0">
+            <a:schemeClr val="accent1"/>
+          </a:effectRef>
+          <a:fontRef idx="minor">
+            <a:schemeClr val="lt1"/>
+          </a:fontRef>
+        </p:style>
+        <p:txBody>
+          <a:bodyPr rtlCol="0" anchor="ctr"/>
+          <a:lstStyle/>
+          <a:p>
+            <a:pPr algn="ctr"/>
+            <a:endParaRPr lang="fr-FR" dirty="0"/>
+          </a:p>
+        </p:txBody>
+      </p:sp>
+      <p:sp>
+        <p:nvSpPr>
+          <p:cNvPr id="27" name="Rectangle 26">
+            <a:extLst>
+              <a:ext uri="{FF2B5EF4-FFF2-40B4-BE49-F238E27FC236}">
+                <a16:creationId xmlns:a16="http://schemas.microsoft.com/office/drawing/2014/main" id="{86A8A64D-B2F1-B818-FF83-F75A8BFFF913}"/>
+              </a:ext>
+            </a:extLst>
+          </p:cNvPr>
+          <p:cNvSpPr/>
+          <p:nvPr/>
+        </p:nvSpPr>
+        <p:spPr>
+          <a:xfrm>
+            <a:off x="2638064" y="1238057"/>
+            <a:ext cx="7200" cy="360000"/>
+          </a:xfrm>
+          <a:prstGeom prst="rect">
+            <a:avLst/>
+          </a:prstGeom>
+          <a:solidFill>
+            <a:schemeClr val="tx1"/>
+          </a:solidFill>
+          <a:ln>
+            <a:noFill/>
+          </a:ln>
+        </p:spPr>
+        <p:style>
+          <a:lnRef idx="2">
+            <a:schemeClr val="accent1">
+              <a:shade val="15000"/>
+            </a:schemeClr>
+          </a:lnRef>
+          <a:fillRef idx="1">
+            <a:schemeClr val="accent1"/>
+          </a:fillRef>
+          <a:effectRef idx="0">
+            <a:schemeClr val="accent1"/>
+          </a:effectRef>
+          <a:fontRef idx="minor">
+            <a:schemeClr val="lt1"/>
+          </a:fontRef>
+        </p:style>
+        <p:txBody>
+          <a:bodyPr rtlCol="0" anchor="ctr"/>
+          <a:lstStyle/>
+          <a:p>
+            <a:pPr algn="ctr"/>
+            <a:endParaRPr lang="fr-FR" dirty="0"/>
+          </a:p>
+        </p:txBody>
+      </p:sp>
+      <p:sp>
+        <p:nvSpPr>
+          <p:cNvPr id="32" name="Rectangle 31">
+            <a:extLst>
+              <a:ext uri="{FF2B5EF4-FFF2-40B4-BE49-F238E27FC236}">
+                <a16:creationId xmlns:a16="http://schemas.microsoft.com/office/drawing/2014/main" id="{391A97FE-5DE9-AA64-FD02-8734031B2CA4}"/>
+              </a:ext>
+            </a:extLst>
+          </p:cNvPr>
+          <p:cNvSpPr/>
+          <p:nvPr/>
+        </p:nvSpPr>
+        <p:spPr>
+          <a:xfrm>
+            <a:off x="2651732" y="1238057"/>
+            <a:ext cx="7200" cy="360000"/>
+          </a:xfrm>
+          <a:prstGeom prst="rect">
+            <a:avLst/>
+          </a:prstGeom>
+          <a:solidFill>
+            <a:schemeClr val="tx1"/>
+          </a:solidFill>
+          <a:ln>
+            <a:noFill/>
+          </a:ln>
+        </p:spPr>
+        <p:style>
+          <a:lnRef idx="2">
+            <a:schemeClr val="accent1">
+              <a:shade val="15000"/>
+            </a:schemeClr>
+          </a:lnRef>
+          <a:fillRef idx="1">
+            <a:schemeClr val="accent1"/>
+          </a:fillRef>
+          <a:effectRef idx="0">
+            <a:schemeClr val="accent1"/>
+          </a:effectRef>
+          <a:fontRef idx="minor">
+            <a:schemeClr val="lt1"/>
+          </a:fontRef>
+        </p:style>
+        <p:txBody>
+          <a:bodyPr rtlCol="0" anchor="ctr"/>
+          <a:lstStyle/>
+          <a:p>
+            <a:pPr algn="ctr"/>
+            <a:endParaRPr lang="fr-FR" dirty="0"/>
+          </a:p>
+        </p:txBody>
+      </p:sp>
+      <p:sp>
+        <p:nvSpPr>
+          <p:cNvPr id="34" name="Rectangle 33">
+            <a:extLst>
+              <a:ext uri="{FF2B5EF4-FFF2-40B4-BE49-F238E27FC236}">
+                <a16:creationId xmlns:a16="http://schemas.microsoft.com/office/drawing/2014/main" id="{EDA0E09D-20E2-F669-DD50-34A6A824B3B5}"/>
+              </a:ext>
+            </a:extLst>
+          </p:cNvPr>
+          <p:cNvSpPr/>
+          <p:nvPr/>
+        </p:nvSpPr>
+        <p:spPr>
+          <a:xfrm>
+            <a:off x="2666132" y="1238057"/>
+            <a:ext cx="7200" cy="360000"/>
+          </a:xfrm>
+          <a:prstGeom prst="rect">
+            <a:avLst/>
+          </a:prstGeom>
+          <a:solidFill>
+            <a:schemeClr val="tx1"/>
+          </a:solidFill>
+          <a:ln>
+            <a:noFill/>
+          </a:ln>
+        </p:spPr>
+        <p:style>
+          <a:lnRef idx="2">
+            <a:schemeClr val="accent1">
+              <a:shade val="15000"/>
+            </a:schemeClr>
+          </a:lnRef>
+          <a:fillRef idx="1">
+            <a:schemeClr val="accent1"/>
+          </a:fillRef>
+          <a:effectRef idx="0">
+            <a:schemeClr val="accent1"/>
+          </a:effectRef>
+          <a:fontRef idx="minor">
+            <a:schemeClr val="lt1"/>
+          </a:fontRef>
+        </p:style>
+        <p:txBody>
+          <a:bodyPr rtlCol="0" anchor="ctr"/>
+          <a:lstStyle/>
+          <a:p>
+            <a:pPr algn="ctr"/>
+            <a:endParaRPr lang="fr-FR" dirty="0"/>
+          </a:p>
+        </p:txBody>
+      </p:sp>
+      <p:sp>
+        <p:nvSpPr>
+          <p:cNvPr id="36" name="Rectangle 35">
+            <a:extLst>
+              <a:ext uri="{FF2B5EF4-FFF2-40B4-BE49-F238E27FC236}">
+                <a16:creationId xmlns:a16="http://schemas.microsoft.com/office/drawing/2014/main" id="{412FA815-1EDA-1185-B37C-0763DC76AA1F}"/>
+              </a:ext>
+            </a:extLst>
+          </p:cNvPr>
+          <p:cNvSpPr/>
+          <p:nvPr/>
+        </p:nvSpPr>
+        <p:spPr>
+          <a:xfrm>
+            <a:off x="2680687" y="1238057"/>
+            <a:ext cx="7200" cy="360000"/>
+          </a:xfrm>
+          <a:prstGeom prst="rect">
+            <a:avLst/>
+          </a:prstGeom>
+          <a:solidFill>
+            <a:schemeClr val="tx1"/>
+          </a:solidFill>
+          <a:ln>
+            <a:noFill/>
+          </a:ln>
+        </p:spPr>
+        <p:style>
+          <a:lnRef idx="2">
+            <a:schemeClr val="accent1">
+              <a:shade val="15000"/>
+            </a:schemeClr>
+          </a:lnRef>
+          <a:fillRef idx="1">
+            <a:schemeClr val="accent1"/>
+          </a:fillRef>
+          <a:effectRef idx="0">
+            <a:schemeClr val="accent1"/>
+          </a:effectRef>
+          <a:fontRef idx="minor">
+            <a:schemeClr val="lt1"/>
+          </a:fontRef>
+        </p:style>
+        <p:txBody>
+          <a:bodyPr rtlCol="0" anchor="ctr"/>
+          <a:lstStyle/>
+          <a:p>
+            <a:pPr algn="ctr"/>
+            <a:endParaRPr lang="fr-FR" dirty="0"/>
+          </a:p>
+        </p:txBody>
+      </p:sp>
+      <p:sp>
+        <p:nvSpPr>
+          <p:cNvPr id="1029" name="Rectangle 1028">
+            <a:extLst>
+              <a:ext uri="{FF2B5EF4-FFF2-40B4-BE49-F238E27FC236}">
+                <a16:creationId xmlns:a16="http://schemas.microsoft.com/office/drawing/2014/main" id="{81205C6B-C306-3CF5-B693-ED06ED879014}"/>
+              </a:ext>
+            </a:extLst>
+          </p:cNvPr>
+          <p:cNvSpPr/>
+          <p:nvPr/>
+        </p:nvSpPr>
+        <p:spPr>
+          <a:xfrm>
+            <a:off x="2694422" y="1238057"/>
+            <a:ext cx="7200" cy="360000"/>
+          </a:xfrm>
+          <a:prstGeom prst="rect">
+            <a:avLst/>
+          </a:prstGeom>
+          <a:solidFill>
+            <a:schemeClr val="tx1"/>
+          </a:solidFill>
+          <a:ln>
+            <a:noFill/>
+          </a:ln>
+        </p:spPr>
+        <p:style>
+          <a:lnRef idx="2">
+            <a:schemeClr val="accent1">
+              <a:shade val="15000"/>
+            </a:schemeClr>
+          </a:lnRef>
+          <a:fillRef idx="1">
+            <a:schemeClr val="accent1"/>
+          </a:fillRef>
+          <a:effectRef idx="0">
+            <a:schemeClr val="accent1"/>
+          </a:effectRef>
+          <a:fontRef idx="minor">
+            <a:schemeClr val="lt1"/>
+          </a:fontRef>
+        </p:style>
+        <p:txBody>
+          <a:bodyPr rtlCol="0" anchor="ctr"/>
+          <a:lstStyle/>
+          <a:p>
+            <a:pPr algn="ctr"/>
+            <a:endParaRPr lang="fr-FR" dirty="0"/>
+          </a:p>
+        </p:txBody>
+      </p:sp>
+      <p:sp>
+        <p:nvSpPr>
+          <p:cNvPr id="1032" name="Rectangle 1031">
+            <a:extLst>
+              <a:ext uri="{FF2B5EF4-FFF2-40B4-BE49-F238E27FC236}">
+                <a16:creationId xmlns:a16="http://schemas.microsoft.com/office/drawing/2014/main" id="{EA2F7795-FE81-030C-42BB-90BB297CCAC0}"/>
+              </a:ext>
+            </a:extLst>
+          </p:cNvPr>
+          <p:cNvSpPr/>
+          <p:nvPr/>
+        </p:nvSpPr>
+        <p:spPr>
+          <a:xfrm>
+            <a:off x="2708977" y="1238057"/>
+            <a:ext cx="7200" cy="360000"/>
+          </a:xfrm>
+          <a:prstGeom prst="rect">
+            <a:avLst/>
+          </a:prstGeom>
+          <a:solidFill>
+            <a:schemeClr val="tx1"/>
+          </a:solidFill>
+          <a:ln>
+            <a:noFill/>
+          </a:ln>
+        </p:spPr>
+        <p:style>
+          <a:lnRef idx="2">
+            <a:schemeClr val="accent1">
+              <a:shade val="15000"/>
+            </a:schemeClr>
+          </a:lnRef>
+          <a:fillRef idx="1">
+            <a:schemeClr val="accent1"/>
+          </a:fillRef>
+          <a:effectRef idx="0">
+            <a:schemeClr val="accent1"/>
+          </a:effectRef>
+          <a:fontRef idx="minor">
+            <a:schemeClr val="lt1"/>
+          </a:fontRef>
+        </p:style>
+        <p:txBody>
+          <a:bodyPr rtlCol="0" anchor="ctr"/>
+          <a:lstStyle/>
+          <a:p>
+            <a:pPr algn="ctr"/>
+            <a:endParaRPr lang="fr-FR" dirty="0"/>
+          </a:p>
+        </p:txBody>
+      </p:sp>
+      <p:sp>
+        <p:nvSpPr>
+          <p:cNvPr id="1034" name="Rectangle 1033">
+            <a:extLst>
+              <a:ext uri="{FF2B5EF4-FFF2-40B4-BE49-F238E27FC236}">
+                <a16:creationId xmlns:a16="http://schemas.microsoft.com/office/drawing/2014/main" id="{ADDA5A20-62AA-2040-9CBF-EC567F5FD6BE}"/>
+              </a:ext>
+            </a:extLst>
+          </p:cNvPr>
+          <p:cNvSpPr/>
+          <p:nvPr/>
+        </p:nvSpPr>
+        <p:spPr>
+          <a:xfrm>
+            <a:off x="2722645" y="1238057"/>
+            <a:ext cx="7200" cy="360000"/>
+          </a:xfrm>
+          <a:prstGeom prst="rect">
+            <a:avLst/>
+          </a:prstGeom>
+          <a:solidFill>
+            <a:schemeClr val="tx1"/>
+          </a:solidFill>
+          <a:ln>
+            <a:noFill/>
+          </a:ln>
+        </p:spPr>
+        <p:style>
+          <a:lnRef idx="2">
+            <a:schemeClr val="accent1">
+              <a:shade val="15000"/>
+            </a:schemeClr>
+          </a:lnRef>
+          <a:fillRef idx="1">
+            <a:schemeClr val="accent1"/>
+          </a:fillRef>
+          <a:effectRef idx="0">
+            <a:schemeClr val="accent1"/>
+          </a:effectRef>
+          <a:fontRef idx="minor">
+            <a:schemeClr val="lt1"/>
+          </a:fontRef>
+        </p:style>
+        <p:txBody>
+          <a:bodyPr rtlCol="0" anchor="ctr"/>
+          <a:lstStyle/>
+          <a:p>
+            <a:pPr algn="ctr"/>
+            <a:endParaRPr lang="fr-FR" dirty="0"/>
+          </a:p>
+        </p:txBody>
+      </p:sp>
+      <p:sp>
+        <p:nvSpPr>
+          <p:cNvPr id="1036" name="Rectangle 1035">
+            <a:extLst>
+              <a:ext uri="{FF2B5EF4-FFF2-40B4-BE49-F238E27FC236}">
+                <a16:creationId xmlns:a16="http://schemas.microsoft.com/office/drawing/2014/main" id="{BAE57A21-C187-B1D4-0D24-64F6140FFC5E}"/>
+              </a:ext>
+            </a:extLst>
+          </p:cNvPr>
+          <p:cNvSpPr/>
+          <p:nvPr/>
+        </p:nvSpPr>
+        <p:spPr>
+          <a:xfrm>
+            <a:off x="2737045" y="1238057"/>
+            <a:ext cx="7200" cy="360000"/>
+          </a:xfrm>
+          <a:prstGeom prst="rect">
+            <a:avLst/>
+          </a:prstGeom>
+          <a:solidFill>
+            <a:schemeClr val="tx1"/>
+          </a:solidFill>
+          <a:ln>
+            <a:noFill/>
+          </a:ln>
+        </p:spPr>
+        <p:style>
+          <a:lnRef idx="2">
+            <a:schemeClr val="accent1">
+              <a:shade val="15000"/>
+            </a:schemeClr>
+          </a:lnRef>
+          <a:fillRef idx="1">
+            <a:schemeClr val="accent1"/>
+          </a:fillRef>
+          <a:effectRef idx="0">
+            <a:schemeClr val="accent1"/>
+          </a:effectRef>
+          <a:fontRef idx="minor">
+            <a:schemeClr val="lt1"/>
+          </a:fontRef>
+        </p:style>
+        <p:txBody>
+          <a:bodyPr rtlCol="0" anchor="ctr"/>
+          <a:lstStyle/>
+          <a:p>
+            <a:pPr algn="ctr"/>
+            <a:endParaRPr lang="fr-FR" dirty="0"/>
+          </a:p>
+        </p:txBody>
+      </p:sp>
+      <p:sp>
+        <p:nvSpPr>
+          <p:cNvPr id="1038" name="Rectangle 1037">
+            <a:extLst>
+              <a:ext uri="{FF2B5EF4-FFF2-40B4-BE49-F238E27FC236}">
+                <a16:creationId xmlns:a16="http://schemas.microsoft.com/office/drawing/2014/main" id="{E2E8EBB5-79F5-D5CC-1474-C6654583CD1B}"/>
+              </a:ext>
+            </a:extLst>
+          </p:cNvPr>
+          <p:cNvSpPr/>
+          <p:nvPr/>
+        </p:nvSpPr>
+        <p:spPr>
+          <a:xfrm>
+            <a:off x="2751600" y="1238057"/>
+            <a:ext cx="7200" cy="360000"/>
+          </a:xfrm>
+          <a:prstGeom prst="rect">
+            <a:avLst/>
+          </a:prstGeom>
+          <a:solidFill>
+            <a:schemeClr val="tx1"/>
+          </a:solidFill>
+          <a:ln>
+            <a:noFill/>
+          </a:ln>
+        </p:spPr>
+        <p:style>
+          <a:lnRef idx="2">
+            <a:schemeClr val="accent1">
+              <a:shade val="15000"/>
+            </a:schemeClr>
+          </a:lnRef>
+          <a:fillRef idx="1">
+            <a:schemeClr val="accent1"/>
+          </a:fillRef>
+          <a:effectRef idx="0">
+            <a:schemeClr val="accent1"/>
+          </a:effectRef>
+          <a:fontRef idx="minor">
+            <a:schemeClr val="lt1"/>
+          </a:fontRef>
+        </p:style>
+        <p:txBody>
+          <a:bodyPr rtlCol="0" anchor="ctr"/>
+          <a:lstStyle/>
+          <a:p>
+            <a:pPr algn="ctr"/>
+            <a:endParaRPr lang="fr-FR" dirty="0"/>
+          </a:p>
+        </p:txBody>
+      </p:sp>
+      <p:sp>
+        <p:nvSpPr>
+          <p:cNvPr id="1040" name="Rectangle 1039">
+            <a:extLst>
+              <a:ext uri="{FF2B5EF4-FFF2-40B4-BE49-F238E27FC236}">
+                <a16:creationId xmlns:a16="http://schemas.microsoft.com/office/drawing/2014/main" id="{FDF3BA30-46B5-96D5-88EB-D6D05B369C87}"/>
+              </a:ext>
+            </a:extLst>
+          </p:cNvPr>
+          <p:cNvSpPr/>
+          <p:nvPr/>
+        </p:nvSpPr>
+        <p:spPr>
+          <a:xfrm>
+            <a:off x="2766000" y="1238057"/>
+            <a:ext cx="7200" cy="360000"/>
+          </a:xfrm>
+          <a:prstGeom prst="rect">
+            <a:avLst/>
+          </a:prstGeom>
+          <a:solidFill>
+            <a:schemeClr val="tx1"/>
+          </a:solidFill>
+          <a:ln>
+            <a:noFill/>
+          </a:ln>
+        </p:spPr>
+        <p:style>
+          <a:lnRef idx="2">
+            <a:schemeClr val="accent1">
+              <a:shade val="15000"/>
+            </a:schemeClr>
+          </a:lnRef>
+          <a:fillRef idx="1">
+            <a:schemeClr val="accent1"/>
+          </a:fillRef>
+          <a:effectRef idx="0">
+            <a:schemeClr val="accent1"/>
+          </a:effectRef>
+          <a:fontRef idx="minor">
+            <a:schemeClr val="lt1"/>
+          </a:fontRef>
+        </p:style>
+        <p:txBody>
+          <a:bodyPr rtlCol="0" anchor="ctr"/>
+          <a:lstStyle/>
+          <a:p>
+            <a:pPr algn="ctr"/>
+            <a:endParaRPr lang="fr-FR" dirty="0"/>
+          </a:p>
+        </p:txBody>
+      </p:sp>
+      <p:sp>
+        <p:nvSpPr>
+          <p:cNvPr id="1042" name="Rectangle 1041">
+            <a:extLst>
+              <a:ext uri="{FF2B5EF4-FFF2-40B4-BE49-F238E27FC236}">
+                <a16:creationId xmlns:a16="http://schemas.microsoft.com/office/drawing/2014/main" id="{4A18500F-5DCA-67D2-D734-5D6F8697C18B}"/>
+              </a:ext>
+            </a:extLst>
+          </p:cNvPr>
+          <p:cNvSpPr/>
+          <p:nvPr/>
+        </p:nvSpPr>
+        <p:spPr>
+          <a:xfrm>
+            <a:off x="2780555" y="1238057"/>
+            <a:ext cx="7200" cy="360000"/>
+          </a:xfrm>
+          <a:prstGeom prst="rect">
+            <a:avLst/>
+          </a:prstGeom>
+          <a:solidFill>
+            <a:schemeClr val="tx1"/>
+          </a:solidFill>
+          <a:ln>
+            <a:noFill/>
+          </a:ln>
+        </p:spPr>
+        <p:style>
+          <a:lnRef idx="2">
+            <a:schemeClr val="accent1">
+              <a:shade val="15000"/>
+            </a:schemeClr>
+          </a:lnRef>
+          <a:fillRef idx="1">
+            <a:schemeClr val="accent1"/>
+          </a:fillRef>
+          <a:effectRef idx="0">
+            <a:schemeClr val="accent1"/>
+          </a:effectRef>
+          <a:fontRef idx="minor">
+            <a:schemeClr val="lt1"/>
+          </a:fontRef>
+        </p:style>
+        <p:txBody>
+          <a:bodyPr rtlCol="0" anchor="ctr"/>
+          <a:lstStyle/>
+          <a:p>
+            <a:pPr algn="ctr"/>
+            <a:endParaRPr lang="fr-FR" dirty="0"/>
+          </a:p>
+        </p:txBody>
+      </p:sp>
+      <p:sp>
+        <p:nvSpPr>
+          <p:cNvPr id="1044" name="Rectangle 1043">
+            <a:extLst>
+              <a:ext uri="{FF2B5EF4-FFF2-40B4-BE49-F238E27FC236}">
+                <a16:creationId xmlns:a16="http://schemas.microsoft.com/office/drawing/2014/main" id="{DEFBEF71-E6F7-1C15-194C-032D730B3B8D}"/>
+              </a:ext>
+            </a:extLst>
+          </p:cNvPr>
+          <p:cNvSpPr/>
+          <p:nvPr/>
+        </p:nvSpPr>
+        <p:spPr>
+          <a:xfrm>
+            <a:off x="2794223" y="1238057"/>
+            <a:ext cx="7200" cy="360000"/>
+          </a:xfrm>
+          <a:prstGeom prst="rect">
+            <a:avLst/>
+          </a:prstGeom>
+          <a:solidFill>
+            <a:schemeClr val="tx1"/>
+          </a:solidFill>
+          <a:ln>
+            <a:noFill/>
+          </a:ln>
+        </p:spPr>
+        <p:style>
+          <a:lnRef idx="2">
+            <a:schemeClr val="accent1">
+              <a:shade val="15000"/>
+            </a:schemeClr>
+          </a:lnRef>
+          <a:fillRef idx="1">
+            <a:schemeClr val="accent1"/>
+          </a:fillRef>
+          <a:effectRef idx="0">
+            <a:schemeClr val="accent1"/>
+          </a:effectRef>
+          <a:fontRef idx="minor">
+            <a:schemeClr val="lt1"/>
+          </a:fontRef>
+        </p:style>
+        <p:txBody>
+          <a:bodyPr rtlCol="0" anchor="ctr"/>
+          <a:lstStyle/>
+          <a:p>
+            <a:pPr algn="ctr"/>
+            <a:endParaRPr lang="fr-FR" dirty="0"/>
+          </a:p>
+        </p:txBody>
+      </p:sp>
+      <p:sp>
+        <p:nvSpPr>
+          <p:cNvPr id="1046" name="Rectangle 1045">
+            <a:extLst>
+              <a:ext uri="{FF2B5EF4-FFF2-40B4-BE49-F238E27FC236}">
+                <a16:creationId xmlns:a16="http://schemas.microsoft.com/office/drawing/2014/main" id="{555E27FA-CEBA-8C16-1D74-C743B63FFE39}"/>
+              </a:ext>
+            </a:extLst>
+          </p:cNvPr>
+          <p:cNvSpPr/>
+          <p:nvPr/>
+        </p:nvSpPr>
+        <p:spPr>
+          <a:xfrm>
+            <a:off x="2808623" y="1238057"/>
+            <a:ext cx="7200" cy="360000"/>
+          </a:xfrm>
+          <a:prstGeom prst="rect">
+            <a:avLst/>
+          </a:prstGeom>
+          <a:solidFill>
+            <a:schemeClr val="tx1"/>
+          </a:solidFill>
+          <a:ln>
+            <a:noFill/>
+          </a:ln>
+        </p:spPr>
+        <p:style>
+          <a:lnRef idx="2">
+            <a:schemeClr val="accent1">
+              <a:shade val="15000"/>
+            </a:schemeClr>
+          </a:lnRef>
+          <a:fillRef idx="1">
+            <a:schemeClr val="accent1"/>
+          </a:fillRef>
+          <a:effectRef idx="0">
+            <a:schemeClr val="accent1"/>
+          </a:effectRef>
+          <a:fontRef idx="minor">
+            <a:schemeClr val="lt1"/>
+          </a:fontRef>
+        </p:style>
+        <p:txBody>
+          <a:bodyPr rtlCol="0" anchor="ctr"/>
+          <a:lstStyle/>
+          <a:p>
+            <a:pPr algn="ctr"/>
+            <a:endParaRPr lang="fr-FR" dirty="0"/>
+          </a:p>
+        </p:txBody>
+      </p:sp>
+      <p:sp>
+        <p:nvSpPr>
+          <p:cNvPr id="1048" name="Rectangle 1047">
+            <a:extLst>
+              <a:ext uri="{FF2B5EF4-FFF2-40B4-BE49-F238E27FC236}">
+                <a16:creationId xmlns:a16="http://schemas.microsoft.com/office/drawing/2014/main" id="{61684BAE-2C22-71BE-8F26-EB5ABACB6492}"/>
+              </a:ext>
+            </a:extLst>
+          </p:cNvPr>
+          <p:cNvSpPr/>
+          <p:nvPr/>
+        </p:nvSpPr>
+        <p:spPr>
+          <a:xfrm>
+            <a:off x="2823178" y="1238057"/>
+            <a:ext cx="7200" cy="360000"/>
+          </a:xfrm>
+          <a:prstGeom prst="rect">
+            <a:avLst/>
+          </a:prstGeom>
+          <a:solidFill>
+            <a:schemeClr val="tx1"/>
+          </a:solidFill>
+          <a:ln>
+            <a:noFill/>
+          </a:ln>
+        </p:spPr>
+        <p:style>
+          <a:lnRef idx="2">
+            <a:schemeClr val="accent1">
+              <a:shade val="15000"/>
+            </a:schemeClr>
+          </a:lnRef>
+          <a:fillRef idx="1">
+            <a:schemeClr val="accent1"/>
+          </a:fillRef>
+          <a:effectRef idx="0">
+            <a:schemeClr val="accent1"/>
+          </a:effectRef>
+          <a:fontRef idx="minor">
+            <a:schemeClr val="lt1"/>
+          </a:fontRef>
+        </p:style>
+        <p:txBody>
+          <a:bodyPr rtlCol="0" anchor="ctr"/>
+          <a:lstStyle/>
+          <a:p>
+            <a:pPr algn="ctr"/>
+            <a:endParaRPr lang="fr-FR" dirty="0"/>
+          </a:p>
+        </p:txBody>
+      </p:sp>
+      <p:sp>
+        <p:nvSpPr>
+          <p:cNvPr id="1050" name="ZoneTexte 1049">
+            <a:extLst>
+              <a:ext uri="{FF2B5EF4-FFF2-40B4-BE49-F238E27FC236}">
+                <a16:creationId xmlns:a16="http://schemas.microsoft.com/office/drawing/2014/main" id="{9E8F4271-5DD0-3C80-1B0F-9BF664435CC1}"/>
+              </a:ext>
+            </a:extLst>
+          </p:cNvPr>
+          <p:cNvSpPr txBox="1"/>
+          <p:nvPr/>
+        </p:nvSpPr>
+        <p:spPr>
+          <a:xfrm rot="16200000">
+            <a:off x="2348676" y="708057"/>
+            <a:ext cx="686406" cy="276999"/>
+          </a:xfrm>
+          <a:prstGeom prst="rect">
+            <a:avLst/>
+          </a:prstGeom>
+          <a:noFill/>
+        </p:spPr>
+        <p:txBody>
+          <a:bodyPr wrap="none" rtlCol="0">
+            <a:spAutoFit/>
+          </a:bodyPr>
+          <a:lstStyle/>
+          <a:p>
+            <a:r>
+              <a:rPr lang="fr-FR" sz="1200" dirty="0"/>
+              <a:t>0.2 mm</a:t>
+            </a:r>
+          </a:p>
+        </p:txBody>
+      </p:sp>
     </p:spTree>
     <p:extLst>
       <p:ext uri="{BB962C8B-B14F-4D97-AF65-F5344CB8AC3E}">

</xml_diff>